<commit_message>
Atualização de errinho besta no slide
</commit_message>
<xml_diff>
--- a/GPS_2014_Modelo de Apresentação FINAL.pptx
+++ b/GPS_2014_Modelo de Apresentação FINAL.pptx
@@ -239,7 +239,7 @@
           <a:p>
             <a:fld id="{5636AE93-340B-406A-850E-69083502E098}" type="datetimeFigureOut">
               <a:rPr lang="pt-BR" smtClean="0"/>
-              <a:t>09/06/2015</a:t>
+              <a:t>10/06/2015</a:t>
             </a:fld>
             <a:endParaRPr lang="pt-BR"/>
           </a:p>
@@ -404,7 +404,7 @@
           <a:p>
             <a:fld id="{D77B3AC6-9B44-4B5C-8B25-D3008DB399E3}" type="datetimeFigureOut">
               <a:rPr lang="pt-BR" smtClean="0"/>
-              <a:t>09/06/2015</a:t>
+              <a:t>10/06/2015</a:t>
             </a:fld>
             <a:endParaRPr lang="pt-BR"/>
           </a:p>
@@ -1363,7 +1363,7 @@
             <a:fld id="{94CDC042-039A-4E80-A826-4614F83E09D2}" type="datetimeFigureOut">
               <a:rPr lang="pt-BR" smtClean="0"/>
               <a:pPr/>
-              <a:t>09/06/2015</a:t>
+              <a:t>10/06/2015</a:t>
             </a:fld>
             <a:endParaRPr lang="pt-BR"/>
           </a:p>
@@ -1542,7 +1542,7 @@
             <a:fld id="{94CDC042-039A-4E80-A826-4614F83E09D2}" type="datetimeFigureOut">
               <a:rPr lang="pt-BR" smtClean="0"/>
               <a:pPr/>
-              <a:t>09/06/2015</a:t>
+              <a:t>10/06/2015</a:t>
             </a:fld>
             <a:endParaRPr lang="pt-BR"/>
           </a:p>
@@ -1724,7 +1724,7 @@
             <a:fld id="{94CDC042-039A-4E80-A826-4614F83E09D2}" type="datetimeFigureOut">
               <a:rPr lang="pt-BR" smtClean="0"/>
               <a:pPr/>
-              <a:t>09/06/2015</a:t>
+              <a:t>10/06/2015</a:t>
             </a:fld>
             <a:endParaRPr lang="pt-BR"/>
           </a:p>
@@ -1896,7 +1896,7 @@
             <a:fld id="{94CDC042-039A-4E80-A826-4614F83E09D2}" type="datetimeFigureOut">
               <a:rPr lang="pt-BR" smtClean="0"/>
               <a:pPr/>
-              <a:t>09/06/2015</a:t>
+              <a:t>10/06/2015</a:t>
             </a:fld>
             <a:endParaRPr lang="pt-BR"/>
           </a:p>
@@ -2151,7 +2151,7 @@
             <a:fld id="{94CDC042-039A-4E80-A826-4614F83E09D2}" type="datetimeFigureOut">
               <a:rPr lang="pt-BR" smtClean="0"/>
               <a:pPr/>
-              <a:t>09/06/2015</a:t>
+              <a:t>10/06/2015</a:t>
             </a:fld>
             <a:endParaRPr lang="pt-BR"/>
           </a:p>
@@ -2448,7 +2448,7 @@
             <a:fld id="{94CDC042-039A-4E80-A826-4614F83E09D2}" type="datetimeFigureOut">
               <a:rPr lang="pt-BR" smtClean="0"/>
               <a:pPr/>
-              <a:t>09/06/2015</a:t>
+              <a:t>10/06/2015</a:t>
             </a:fld>
             <a:endParaRPr lang="pt-BR"/>
           </a:p>
@@ -2879,7 +2879,7 @@
             <a:fld id="{94CDC042-039A-4E80-A826-4614F83E09D2}" type="datetimeFigureOut">
               <a:rPr lang="pt-BR" smtClean="0"/>
               <a:pPr/>
-              <a:t>09/06/2015</a:t>
+              <a:t>10/06/2015</a:t>
             </a:fld>
             <a:endParaRPr lang="pt-BR"/>
           </a:p>
@@ -3013,7 +3013,7 @@
             <a:fld id="{94CDC042-039A-4E80-A826-4614F83E09D2}" type="datetimeFigureOut">
               <a:rPr lang="pt-BR" smtClean="0"/>
               <a:pPr/>
-              <a:t>09/06/2015</a:t>
+              <a:t>10/06/2015</a:t>
             </a:fld>
             <a:endParaRPr lang="pt-BR"/>
           </a:p>
@@ -3131,7 +3131,7 @@
             <a:fld id="{94CDC042-039A-4E80-A826-4614F83E09D2}" type="datetimeFigureOut">
               <a:rPr lang="pt-BR" smtClean="0"/>
               <a:pPr/>
-              <a:t>09/06/2015</a:t>
+              <a:t>10/06/2015</a:t>
             </a:fld>
             <a:endParaRPr lang="pt-BR"/>
           </a:p>
@@ -3417,7 +3417,7 @@
             <a:fld id="{94CDC042-039A-4E80-A826-4614F83E09D2}" type="datetimeFigureOut">
               <a:rPr lang="pt-BR" smtClean="0"/>
               <a:pPr/>
-              <a:t>09/06/2015</a:t>
+              <a:t>10/06/2015</a:t>
             </a:fld>
             <a:endParaRPr lang="pt-BR"/>
           </a:p>
@@ -3679,7 +3679,7 @@
             <a:fld id="{94CDC042-039A-4E80-A826-4614F83E09D2}" type="datetimeFigureOut">
               <a:rPr lang="pt-BR" smtClean="0"/>
               <a:pPr/>
-              <a:t>09/06/2015</a:t>
+              <a:t>10/06/2015</a:t>
             </a:fld>
             <a:endParaRPr lang="pt-BR"/>
           </a:p>
@@ -3903,7 +3903,7 @@
             <a:fld id="{94CDC042-039A-4E80-A826-4614F83E09D2}" type="datetimeFigureOut">
               <a:rPr lang="pt-BR" smtClean="0"/>
               <a:pPr/>
-              <a:t>09/06/2015</a:t>
+              <a:t>10/06/2015</a:t>
             </a:fld>
             <a:endParaRPr lang="pt-BR"/>
           </a:p>
@@ -5581,16 +5581,7 @@
                           </a:solidFill>
                           <a:effectLst/>
                         </a:rPr>
-                        <a:t> – </a:t>
-                      </a:r>
-                      <a:r>
-                        <a:rPr lang="pt-BR" sz="1600" u="none" strike="noStrike" baseline="0" dirty="0" smtClean="0">
-                          <a:solidFill>
-                            <a:schemeClr val="bg1"/>
-                          </a:solidFill>
-                          <a:effectLst/>
-                        </a:rPr>
-                        <a:t>Entrega 3</a:t>
+                        <a:t> – Entrega 3</a:t>
                       </a:r>
                       <a:endParaRPr lang="pt-BR" sz="1600" b="1" i="0" u="none" strike="noStrike" dirty="0">
                         <a:solidFill>
@@ -5631,17 +5622,7 @@
                           <a:effectLst/>
                           <a:latin typeface="+mn-lt"/>
                         </a:rPr>
-                        <a:t> de Qualidade </a:t>
-                      </a:r>
-                      <a:r>
-                        <a:rPr lang="pt-BR" sz="1600" b="0" i="0" u="none" strike="noStrike" baseline="0" dirty="0" smtClean="0">
-                          <a:solidFill>
-                            <a:schemeClr val="bg1"/>
-                          </a:solidFill>
-                          <a:effectLst/>
-                          <a:latin typeface="+mn-lt"/>
-                        </a:rPr>
-                        <a:t>–</a:t>
+                        <a:t> de Qualidade –</a:t>
                       </a:r>
                     </a:p>
                     <a:p>
@@ -6729,15 +6710,7 @@
                 <a:ea typeface="Tahoma" panose="020B0604030504040204" pitchFamily="34" charset="0"/>
                 <a:cs typeface="Tahoma" panose="020B0604030504040204" pitchFamily="34" charset="0"/>
               </a:rPr>
-              <a:t>Como </a:t>
-            </a:r>
-            <a:r>
-              <a:rPr lang="pt-BR" sz="2400" dirty="0" smtClean="0">
-                <a:latin typeface="Tahoma" panose="020B0604030504040204" pitchFamily="34" charset="0"/>
-                <a:ea typeface="Tahoma" panose="020B0604030504040204" pitchFamily="34" charset="0"/>
-                <a:cs typeface="Tahoma" panose="020B0604030504040204" pitchFamily="34" charset="0"/>
-              </a:rPr>
-              <a:t>agir em equipe respeitando diferenças/pensamentos.</a:t>
+              <a:t>Como agir em equipe respeitando diferenças/pensamentos.</a:t>
             </a:r>
           </a:p>
           <a:p>
@@ -6880,7 +6853,7 @@
                                         <p:tgtEl>
                                           <p:spTgt spid="2">
                                             <p:txEl>
-                                              <p:pRg st="2" end="2"/>
+                                              <p:pRg st="0" end="0"/>
                                             </p:txEl>
                                           </p:spTgt>
                                         </p:tgtEl>
@@ -6898,7 +6871,7 @@
                                         <p:tgtEl>
                                           <p:spTgt spid="2">
                                             <p:txEl>
-                                              <p:pRg st="2" end="2"/>
+                                              <p:pRg st="0" end="0"/>
                                             </p:txEl>
                                           </p:spTgt>
                                         </p:tgtEl>
@@ -6925,7 +6898,7 @@
                                         <p:tgtEl>
                                           <p:spTgt spid="2">
                                             <p:txEl>
-                                              <p:pRg st="2" end="2"/>
+                                              <p:pRg st="0" end="0"/>
                                             </p:txEl>
                                           </p:spTgt>
                                         </p:tgtEl>
@@ -6983,7 +6956,7 @@
                                         <p:tgtEl>
                                           <p:spTgt spid="2">
                                             <p:txEl>
-                                              <p:pRg st="0" end="0"/>
+                                              <p:pRg st="2" end="2"/>
                                             </p:txEl>
                                           </p:spTgt>
                                         </p:tgtEl>
@@ -7001,7 +6974,7 @@
                                         <p:tgtEl>
                                           <p:spTgt spid="2">
                                             <p:txEl>
-                                              <p:pRg st="0" end="0"/>
+                                              <p:pRg st="2" end="2"/>
                                             </p:txEl>
                                           </p:spTgt>
                                         </p:tgtEl>
@@ -7028,7 +7001,7 @@
                                         <p:tgtEl>
                                           <p:spTgt spid="2">
                                             <p:txEl>
-                                              <p:pRg st="0" end="0"/>
+                                              <p:pRg st="2" end="2"/>
                                             </p:txEl>
                                           </p:spTgt>
                                         </p:tgtEl>
@@ -8739,13 +8712,13 @@
   <p:clrMapOvr>
     <a:masterClrMapping/>
   </p:clrMapOvr>
-  <mc:AlternateContent xmlns:mc="http://schemas.openxmlformats.org/markup-compatibility/2006">
-    <mc:Choice xmlns:p14="http://schemas.microsoft.com/office/powerpoint/2010/main" Requires="p14">
+  <mc:AlternateContent xmlns:mc="http://schemas.openxmlformats.org/markup-compatibility/2006" xmlns:p14="http://schemas.microsoft.com/office/powerpoint/2010/main">
+    <mc:Choice Requires="p14">
       <p:transition spd="slow" p14:dur="1500">
         <p14:window dir="vert"/>
       </p:transition>
     </mc:Choice>
-    <mc:Fallback>
+    <mc:Fallback xmlns="">
       <p:transition spd="slow">
         <p:fade/>
       </p:transition>
@@ -10380,11 +10353,6 @@
               </a:rPr>
               <a:t>Documentação, Codificação, Modelagem e Design do site</a:t>
             </a:r>
-            <a:endParaRPr lang="pt-BR" sz="2400" dirty="0" smtClean="0">
-              <a:latin typeface="Tahoma" panose="020B0604030504040204" pitchFamily="34" charset="0"/>
-              <a:ea typeface="Tahoma" panose="020B0604030504040204" pitchFamily="34" charset="0"/>
-              <a:cs typeface="Tahoma" panose="020B0604030504040204" pitchFamily="34" charset="0"/>
-            </a:endParaRPr>
           </a:p>
         </p:txBody>
       </p:sp>
@@ -10458,13 +10426,13 @@
   <p:clrMapOvr>
     <a:masterClrMapping/>
   </p:clrMapOvr>
-  <mc:AlternateContent xmlns:mc="http://schemas.openxmlformats.org/markup-compatibility/2006">
-    <mc:Choice xmlns:p14="http://schemas.microsoft.com/office/powerpoint/2010/main" Requires="p14">
+  <mc:AlternateContent xmlns:mc="http://schemas.openxmlformats.org/markup-compatibility/2006" xmlns:p14="http://schemas.microsoft.com/office/powerpoint/2010/main">
+    <mc:Choice Requires="p14">
       <p:transition spd="slow" p14:dur="1500">
         <p:split orient="vert"/>
       </p:transition>
     </mc:Choice>
-    <mc:Fallback>
+    <mc:Fallback xmlns="">
       <p:transition spd="slow">
         <p:split orient="vert"/>
       </p:transition>

</xml_diff>